<commit_message>
Restructured repo and added a project logo
</commit_message>
<xml_diff>
--- a/Keyboard.pptx
+++ b/Keyboard.pptx
@@ -6,6 +6,7 @@
   </p:sldMasterIdLst>
   <p:sldIdLst>
     <p:sldId id="256" r:id="rId2"/>
+    <p:sldId id="257" r:id="rId3"/>
   </p:sldIdLst>
   <p:sldSz cx="12192000" cy="6858000"/>
   <p:notesSz cx="6858000" cy="9144000"/>
@@ -104,7 +105,160 @@
       </a:defRPr>
     </a:lvl9pPr>
   </p:defaultTextStyle>
+  <p:extLst>
+    <p:ext uri="{EFAFB233-063F-42B5-8137-9DF3F51BA10A}">
+      <p15:sldGuideLst xmlns:p15="http://schemas.microsoft.com/office/powerpoint/2012/main"/>
+    </p:ext>
+  </p:extLst>
 </p:presentation>
+</file>
+
+<file path=ppt/revisionInfo.xml><?xml version="1.0" encoding="utf-8"?>
+<p1510:revInfo xmlns:a="http://schemas.openxmlformats.org/drawingml/2006/main" xmlns:r="http://schemas.openxmlformats.org/officeDocument/2006/relationships" xmlns:p1510="http://schemas.microsoft.com/office/powerpoint/2015/10/main">
+  <p1510:revLst>
+    <p1510:client id="{4D1EA6F5-2DBF-4EAD-9903-039B96CD5F6D}" v="7" dt="2025-06-09T12:03:29.834"/>
+  </p1510:revLst>
+</p1510:revInfo>
+</file>
+
+<file path=ppt/changesInfos/changesInfo1.xml><?xml version="1.0" encoding="utf-8"?>
+<pc:chgInfo xmlns:a="http://schemas.openxmlformats.org/drawingml/2006/main" xmlns:r="http://schemas.openxmlformats.org/officeDocument/2006/relationships" xmlns:ac="http://schemas.microsoft.com/office/drawing/2013/main/command" xmlns:pc="http://schemas.microsoft.com/office/powerpoint/2013/main/command">
+  <pc:docChgLst>
+    <pc:chgData name="Jan K" userId="d066db4a5de46abf" providerId="LiveId" clId="{4D1EA6F5-2DBF-4EAD-9903-039B96CD5F6D}"/>
+    <pc:docChg chg="undo custSel addSld modSld">
+      <pc:chgData name="Jan K" userId="d066db4a5de46abf" providerId="LiveId" clId="{4D1EA6F5-2DBF-4EAD-9903-039B96CD5F6D}" dt="2025-06-09T12:03:52.734" v="367" actId="1076"/>
+      <pc:docMkLst>
+        <pc:docMk/>
+      </pc:docMkLst>
+      <pc:sldChg chg="addSp delSp modSp mod">
+        <pc:chgData name="Jan K" userId="d066db4a5de46abf" providerId="LiveId" clId="{4D1EA6F5-2DBF-4EAD-9903-039B96CD5F6D}" dt="2025-06-09T11:47:30.431" v="1" actId="478"/>
+        <pc:sldMkLst>
+          <pc:docMk/>
+          <pc:sldMk cId="1769758440" sldId="256"/>
+        </pc:sldMkLst>
+        <pc:picChg chg="add del mod">
+          <ac:chgData name="Jan K" userId="d066db4a5de46abf" providerId="LiveId" clId="{4D1EA6F5-2DBF-4EAD-9903-039B96CD5F6D}" dt="2025-06-09T11:47:30.431" v="1" actId="478"/>
+          <ac:picMkLst>
+            <pc:docMk/>
+            <pc:sldMk cId="1769758440" sldId="256"/>
+            <ac:picMk id="3" creationId="{587F05E9-1D7E-AB75-D652-9615536A1CEF}"/>
+          </ac:picMkLst>
+        </pc:picChg>
+      </pc:sldChg>
+      <pc:sldChg chg="addSp delSp modSp new mod">
+        <pc:chgData name="Jan K" userId="d066db4a5de46abf" providerId="LiveId" clId="{4D1EA6F5-2DBF-4EAD-9903-039B96CD5F6D}" dt="2025-06-09T12:03:52.734" v="367" actId="1076"/>
+        <pc:sldMkLst>
+          <pc:docMk/>
+          <pc:sldMk cId="2680026350" sldId="257"/>
+        </pc:sldMkLst>
+        <pc:spChg chg="del">
+          <ac:chgData name="Jan K" userId="d066db4a5de46abf" providerId="LiveId" clId="{4D1EA6F5-2DBF-4EAD-9903-039B96CD5F6D}" dt="2025-06-09T11:51:10.229" v="7" actId="478"/>
+          <ac:spMkLst>
+            <pc:docMk/>
+            <pc:sldMk cId="2680026350" sldId="257"/>
+            <ac:spMk id="2" creationId="{B2CB8B56-4891-4693-79F3-D0B48C0A2AED}"/>
+          </ac:spMkLst>
+        </pc:spChg>
+        <pc:spChg chg="del">
+          <ac:chgData name="Jan K" userId="d066db4a5de46abf" providerId="LiveId" clId="{4D1EA6F5-2DBF-4EAD-9903-039B96CD5F6D}" dt="2025-06-09T11:51:03.479" v="3"/>
+          <ac:spMkLst>
+            <pc:docMk/>
+            <pc:sldMk cId="2680026350" sldId="257"/>
+            <ac:spMk id="3" creationId="{F8259ABB-809E-4445-0D52-F2A9D58C7B32}"/>
+          </ac:spMkLst>
+        </pc:spChg>
+        <pc:spChg chg="add mod">
+          <ac:chgData name="Jan K" userId="d066db4a5de46abf" providerId="LiveId" clId="{4D1EA6F5-2DBF-4EAD-9903-039B96CD5F6D}" dt="2025-06-09T12:03:52.734" v="367" actId="1076"/>
+          <ac:spMkLst>
+            <pc:docMk/>
+            <pc:sldMk cId="2680026350" sldId="257"/>
+            <ac:spMk id="6" creationId="{CF91C789-AD43-E795-1D64-C112F4E6FA92}"/>
+          </ac:spMkLst>
+        </pc:spChg>
+        <pc:spChg chg="add mod">
+          <ac:chgData name="Jan K" userId="d066db4a5de46abf" providerId="LiveId" clId="{4D1EA6F5-2DBF-4EAD-9903-039B96CD5F6D}" dt="2025-06-09T12:03:03.084" v="356" actId="1076"/>
+          <ac:spMkLst>
+            <pc:docMk/>
+            <pc:sldMk cId="2680026350" sldId="257"/>
+            <ac:spMk id="7" creationId="{5DEEFAD6-68D7-D74B-5A64-230C51DE47D1}"/>
+          </ac:spMkLst>
+        </pc:spChg>
+        <pc:spChg chg="add del mod">
+          <ac:chgData name="Jan K" userId="d066db4a5de46abf" providerId="LiveId" clId="{4D1EA6F5-2DBF-4EAD-9903-039B96CD5F6D}" dt="2025-06-09T12:02:36.683" v="349" actId="478"/>
+          <ac:spMkLst>
+            <pc:docMk/>
+            <pc:sldMk cId="2680026350" sldId="257"/>
+            <ac:spMk id="8" creationId="{97C0BA35-A2BC-01D9-19CD-C7CEB77CD3B7}"/>
+          </ac:spMkLst>
+        </pc:spChg>
+        <pc:spChg chg="add del mod">
+          <ac:chgData name="Jan K" userId="d066db4a5de46abf" providerId="LiveId" clId="{4D1EA6F5-2DBF-4EAD-9903-039B96CD5F6D}" dt="2025-06-09T12:02:37.534" v="350" actId="478"/>
+          <ac:spMkLst>
+            <pc:docMk/>
+            <pc:sldMk cId="2680026350" sldId="257"/>
+            <ac:spMk id="9" creationId="{C8259A57-31DE-2AEA-6114-EAE09848D110}"/>
+          </ac:spMkLst>
+        </pc:spChg>
+        <pc:spChg chg="add mod ord">
+          <ac:chgData name="Jan K" userId="d066db4a5de46abf" providerId="LiveId" clId="{4D1EA6F5-2DBF-4EAD-9903-039B96CD5F6D}" dt="2025-06-09T11:57:32.402" v="178" actId="14100"/>
+          <ac:spMkLst>
+            <pc:docMk/>
+            <pc:sldMk cId="2680026350" sldId="257"/>
+            <ac:spMk id="10" creationId="{C2933395-B820-B417-A274-F243E931FAD4}"/>
+          </ac:spMkLst>
+        </pc:spChg>
+        <pc:spChg chg="add del mod">
+          <ac:chgData name="Jan K" userId="d066db4a5de46abf" providerId="LiveId" clId="{4D1EA6F5-2DBF-4EAD-9903-039B96CD5F6D}" dt="2025-06-09T12:02:24.459" v="348"/>
+          <ac:spMkLst>
+            <pc:docMk/>
+            <pc:sldMk cId="2680026350" sldId="257"/>
+            <ac:spMk id="11" creationId="{F3E74136-22B8-AD20-02CC-8E6B9549C062}"/>
+          </ac:spMkLst>
+        </pc:spChg>
+        <pc:spChg chg="add mod">
+          <ac:chgData name="Jan K" userId="d066db4a5de46abf" providerId="LiveId" clId="{4D1EA6F5-2DBF-4EAD-9903-039B96CD5F6D}" dt="2025-06-09T12:03:05.974" v="357" actId="1076"/>
+          <ac:spMkLst>
+            <pc:docMk/>
+            <pc:sldMk cId="2680026350" sldId="257"/>
+            <ac:spMk id="12" creationId="{31F8BDD7-DD91-37AF-3DF3-A873A72B0063}"/>
+          </ac:spMkLst>
+        </pc:spChg>
+        <pc:spChg chg="add mod">
+          <ac:chgData name="Jan K" userId="d066db4a5de46abf" providerId="LiveId" clId="{4D1EA6F5-2DBF-4EAD-9903-039B96CD5F6D}" dt="2025-06-09T12:03:08.971" v="358" actId="1076"/>
+          <ac:spMkLst>
+            <pc:docMk/>
+            <pc:sldMk cId="2680026350" sldId="257"/>
+            <ac:spMk id="13" creationId="{CC345A07-23E3-6153-B14C-070298102D12}"/>
+          </ac:spMkLst>
+        </pc:spChg>
+        <pc:spChg chg="add mod">
+          <ac:chgData name="Jan K" userId="d066db4a5de46abf" providerId="LiveId" clId="{4D1EA6F5-2DBF-4EAD-9903-039B96CD5F6D}" dt="2025-06-09T12:03:28.826" v="364" actId="1076"/>
+          <ac:spMkLst>
+            <pc:docMk/>
+            <pc:sldMk cId="2680026350" sldId="257"/>
+            <ac:spMk id="14" creationId="{56D3AB65-E2E8-1D9C-9C30-C534564AF33D}"/>
+          </ac:spMkLst>
+        </pc:spChg>
+        <pc:spChg chg="add mod">
+          <ac:chgData name="Jan K" userId="d066db4a5de46abf" providerId="LiveId" clId="{4D1EA6F5-2DBF-4EAD-9903-039B96CD5F6D}" dt="2025-06-09T12:03:32.914" v="366" actId="1076"/>
+          <ac:spMkLst>
+            <pc:docMk/>
+            <pc:sldMk cId="2680026350" sldId="257"/>
+            <ac:spMk id="15" creationId="{A2E9077D-A1A5-E29E-CCD7-E1729DA5768B}"/>
+          </ac:spMkLst>
+        </pc:spChg>
+        <pc:picChg chg="add mod modCrop">
+          <ac:chgData name="Jan K" userId="d066db4a5de46abf" providerId="LiveId" clId="{4D1EA6F5-2DBF-4EAD-9903-039B96CD5F6D}" dt="2025-06-09T12:03:11.843" v="360" actId="1076"/>
+          <ac:picMkLst>
+            <pc:docMk/>
+            <pc:sldMk cId="2680026350" sldId="257"/>
+            <ac:picMk id="5" creationId="{9E3203B4-36B3-F0B9-6090-45F08C464095}"/>
+          </ac:picMkLst>
+        </pc:picChg>
+      </pc:sldChg>
+    </pc:docChg>
+  </pc:docChgLst>
+</pc:chgInfo>
 </file>
 
 <file path=ppt/slideLayouts/slideLayout1.xml><?xml version="1.0" encoding="utf-8"?>
@@ -254,7 +408,7 @@
           <a:p>
             <a:fld id="{073B57D9-4D53-49FB-94EA-DB810B438128}" type="datetimeFigureOut">
               <a:rPr lang="en-US" smtClean="0"/>
-              <a:t>5/30/2025</a:t>
+              <a:t>6/9/2025</a:t>
             </a:fld>
             <a:endParaRPr lang="en-US"/>
           </a:p>
@@ -452,7 +606,7 @@
           <a:p>
             <a:fld id="{073B57D9-4D53-49FB-94EA-DB810B438128}" type="datetimeFigureOut">
               <a:rPr lang="en-US" smtClean="0"/>
-              <a:t>5/30/2025</a:t>
+              <a:t>6/9/2025</a:t>
             </a:fld>
             <a:endParaRPr lang="en-US"/>
           </a:p>
@@ -660,7 +814,7 @@
           <a:p>
             <a:fld id="{073B57D9-4D53-49FB-94EA-DB810B438128}" type="datetimeFigureOut">
               <a:rPr lang="en-US" smtClean="0"/>
-              <a:t>5/30/2025</a:t>
+              <a:t>6/9/2025</a:t>
             </a:fld>
             <a:endParaRPr lang="en-US"/>
           </a:p>
@@ -858,7 +1012,7 @@
           <a:p>
             <a:fld id="{073B57D9-4D53-49FB-94EA-DB810B438128}" type="datetimeFigureOut">
               <a:rPr lang="en-US" smtClean="0"/>
-              <a:t>5/30/2025</a:t>
+              <a:t>6/9/2025</a:t>
             </a:fld>
             <a:endParaRPr lang="en-US"/>
           </a:p>
@@ -1133,7 +1287,7 @@
           <a:p>
             <a:fld id="{073B57D9-4D53-49FB-94EA-DB810B438128}" type="datetimeFigureOut">
               <a:rPr lang="en-US" smtClean="0"/>
-              <a:t>5/30/2025</a:t>
+              <a:t>6/9/2025</a:t>
             </a:fld>
             <a:endParaRPr lang="en-US"/>
           </a:p>
@@ -1398,7 +1552,7 @@
           <a:p>
             <a:fld id="{073B57D9-4D53-49FB-94EA-DB810B438128}" type="datetimeFigureOut">
               <a:rPr lang="en-US" smtClean="0"/>
-              <a:t>5/30/2025</a:t>
+              <a:t>6/9/2025</a:t>
             </a:fld>
             <a:endParaRPr lang="en-US"/>
           </a:p>
@@ -1810,7 +1964,7 @@
           <a:p>
             <a:fld id="{073B57D9-4D53-49FB-94EA-DB810B438128}" type="datetimeFigureOut">
               <a:rPr lang="en-US" smtClean="0"/>
-              <a:t>5/30/2025</a:t>
+              <a:t>6/9/2025</a:t>
             </a:fld>
             <a:endParaRPr lang="en-US"/>
           </a:p>
@@ -1951,7 +2105,7 @@
           <a:p>
             <a:fld id="{073B57D9-4D53-49FB-94EA-DB810B438128}" type="datetimeFigureOut">
               <a:rPr lang="en-US" smtClean="0"/>
-              <a:t>5/30/2025</a:t>
+              <a:t>6/9/2025</a:t>
             </a:fld>
             <a:endParaRPr lang="en-US"/>
           </a:p>
@@ -2064,7 +2218,7 @@
           <a:p>
             <a:fld id="{073B57D9-4D53-49FB-94EA-DB810B438128}" type="datetimeFigureOut">
               <a:rPr lang="en-US" smtClean="0"/>
-              <a:t>5/30/2025</a:t>
+              <a:t>6/9/2025</a:t>
             </a:fld>
             <a:endParaRPr lang="en-US"/>
           </a:p>
@@ -2375,7 +2529,7 @@
           <a:p>
             <a:fld id="{073B57D9-4D53-49FB-94EA-DB810B438128}" type="datetimeFigureOut">
               <a:rPr lang="en-US" smtClean="0"/>
-              <a:t>5/30/2025</a:t>
+              <a:t>6/9/2025</a:t>
             </a:fld>
             <a:endParaRPr lang="en-US"/>
           </a:p>
@@ -2663,7 +2817,7 @@
           <a:p>
             <a:fld id="{073B57D9-4D53-49FB-94EA-DB810B438128}" type="datetimeFigureOut">
               <a:rPr lang="en-US" smtClean="0"/>
-              <a:t>5/30/2025</a:t>
+              <a:t>6/9/2025</a:t>
             </a:fld>
             <a:endParaRPr lang="en-US"/>
           </a:p>
@@ -2904,7 +3058,7 @@
           <a:p>
             <a:fld id="{073B57D9-4D53-49FB-94EA-DB810B438128}" type="datetimeFigureOut">
               <a:rPr lang="en-US" smtClean="0"/>
-              <a:t>5/30/2025</a:t>
+              <a:t>6/9/2025</a:t>
             </a:fld>
             <a:endParaRPr lang="en-US"/>
           </a:p>
@@ -3959,6 +4113,448 @@
 </p:sld>
 </file>
 
+<file path=ppt/slides/slide2.xml><?xml version="1.0" encoding="utf-8"?>
+<p:sld xmlns:a="http://schemas.openxmlformats.org/drawingml/2006/main" xmlns:r="http://schemas.openxmlformats.org/officeDocument/2006/relationships" xmlns:p="http://schemas.openxmlformats.org/presentationml/2006/main">
+  <p:cSld>
+    <p:spTree>
+      <p:nvGrpSpPr>
+        <p:cNvPr id="1" name=""/>
+        <p:cNvGrpSpPr/>
+        <p:nvPr/>
+      </p:nvGrpSpPr>
+      <p:grpSpPr>
+        <a:xfrm>
+          <a:off x="0" y="0"/>
+          <a:ext cx="0" cy="0"/>
+          <a:chOff x="0" y="0"/>
+          <a:chExt cx="0" cy="0"/>
+        </a:xfrm>
+      </p:grpSpPr>
+      <p:sp>
+        <p:nvSpPr>
+          <p:cNvPr id="10" name="Rectangle 9">
+            <a:extLst>
+              <a:ext uri="{FF2B5EF4-FFF2-40B4-BE49-F238E27FC236}">
+                <a16:creationId xmlns:a16="http://schemas.microsoft.com/office/drawing/2014/main" id="{C2933395-B820-B417-A274-F243E931FAD4}"/>
+              </a:ext>
+            </a:extLst>
+          </p:cNvPr>
+          <p:cNvSpPr/>
+          <p:nvPr/>
+        </p:nvSpPr>
+        <p:spPr>
+          <a:xfrm>
+            <a:off x="3158091" y="2156419"/>
+            <a:ext cx="2952000" cy="1944000"/>
+          </a:xfrm>
+          <a:prstGeom prst="rect">
+            <a:avLst/>
+          </a:prstGeom>
+          <a:solidFill>
+            <a:schemeClr val="bg1">
+              <a:lumMod val="95000"/>
+            </a:schemeClr>
+          </a:solidFill>
+          <a:ln>
+            <a:solidFill>
+              <a:schemeClr val="tx1"/>
+            </a:solidFill>
+          </a:ln>
+        </p:spPr>
+        <p:style>
+          <a:lnRef idx="2">
+            <a:schemeClr val="accent1">
+              <a:shade val="15000"/>
+            </a:schemeClr>
+          </a:lnRef>
+          <a:fillRef idx="1">
+            <a:schemeClr val="accent1"/>
+          </a:fillRef>
+          <a:effectRef idx="0">
+            <a:schemeClr val="accent1"/>
+          </a:effectRef>
+          <a:fontRef idx="minor">
+            <a:schemeClr val="lt1"/>
+          </a:fontRef>
+        </p:style>
+        <p:txBody>
+          <a:bodyPr rtlCol="0" anchor="ctr"/>
+          <a:lstStyle/>
+          <a:p>
+            <a:pPr algn="ctr"/>
+            <a:endParaRPr lang="en-US"/>
+          </a:p>
+        </p:txBody>
+      </p:sp>
+      <p:pic>
+        <p:nvPicPr>
+          <p:cNvPr id="5" name="Content Placeholder 4" descr="A logo of a keyboard&#10;&#10;Description automatically generated">
+            <a:extLst>
+              <a:ext uri="{FF2B5EF4-FFF2-40B4-BE49-F238E27FC236}">
+                <a16:creationId xmlns:a16="http://schemas.microsoft.com/office/drawing/2014/main" id="{9E3203B4-36B3-F0B9-6090-45F08C464095}"/>
+              </a:ext>
+            </a:extLst>
+          </p:cNvPr>
+          <p:cNvPicPr>
+            <a:picLocks noGrp="1" noChangeAspect="1"/>
+          </p:cNvPicPr>
+          <p:nvPr>
+            <p:ph idx="1"/>
+          </p:nvPr>
+        </p:nvPicPr>
+        <p:blipFill>
+          <a:blip r:embed="rId2"/>
+          <a:srcRect t="22306" b="37450"/>
+          <a:stretch/>
+        </p:blipFill>
+        <p:spPr>
+          <a:xfrm>
+            <a:off x="1544277" y="1867919"/>
+            <a:ext cx="6167000" cy="2547606"/>
+          </a:xfrm>
+        </p:spPr>
+      </p:pic>
+      <p:sp>
+        <p:nvSpPr>
+          <p:cNvPr id="6" name="Oval 5">
+            <a:extLst>
+              <a:ext uri="{FF2B5EF4-FFF2-40B4-BE49-F238E27FC236}">
+                <a16:creationId xmlns:a16="http://schemas.microsoft.com/office/drawing/2014/main" id="{CF91C789-AD43-E795-1D64-C112F4E6FA92}"/>
+              </a:ext>
+            </a:extLst>
+          </p:cNvPr>
+          <p:cNvSpPr/>
+          <p:nvPr/>
+        </p:nvSpPr>
+        <p:spPr>
+          <a:xfrm>
+            <a:off x="4177777" y="3200419"/>
+            <a:ext cx="900000" cy="900000"/>
+          </a:xfrm>
+          <a:prstGeom prst="ellipse">
+            <a:avLst/>
+          </a:prstGeom>
+          <a:solidFill>
+            <a:schemeClr val="tx1"/>
+          </a:solidFill>
+          <a:ln w="57150">
+            <a:solidFill>
+              <a:srgbClr val="FFC000"/>
+            </a:solidFill>
+          </a:ln>
+        </p:spPr>
+        <p:style>
+          <a:lnRef idx="2">
+            <a:schemeClr val="accent1">
+              <a:shade val="15000"/>
+            </a:schemeClr>
+          </a:lnRef>
+          <a:fillRef idx="1">
+            <a:schemeClr val="accent1"/>
+          </a:fillRef>
+          <a:effectRef idx="0">
+            <a:schemeClr val="accent1"/>
+          </a:effectRef>
+          <a:fontRef idx="minor">
+            <a:schemeClr val="lt1"/>
+          </a:fontRef>
+        </p:style>
+        <p:txBody>
+          <a:bodyPr rtlCol="0" anchor="ctr"/>
+          <a:lstStyle/>
+          <a:p>
+            <a:pPr algn="ctr"/>
+            <a:endParaRPr lang="en-US"/>
+          </a:p>
+        </p:txBody>
+      </p:sp>
+      <p:sp>
+        <p:nvSpPr>
+          <p:cNvPr id="7" name="Rectangle 6">
+            <a:extLst>
+              <a:ext uri="{FF2B5EF4-FFF2-40B4-BE49-F238E27FC236}">
+                <a16:creationId xmlns:a16="http://schemas.microsoft.com/office/drawing/2014/main" id="{5DEEFAD6-68D7-D74B-5A64-230C51DE47D1}"/>
+              </a:ext>
+            </a:extLst>
+          </p:cNvPr>
+          <p:cNvSpPr/>
+          <p:nvPr/>
+        </p:nvSpPr>
+        <p:spPr>
+          <a:xfrm>
+            <a:off x="4159777" y="2253292"/>
+            <a:ext cx="936000" cy="684000"/>
+          </a:xfrm>
+          <a:prstGeom prst="rect">
+            <a:avLst/>
+          </a:prstGeom>
+          <a:solidFill>
+            <a:schemeClr val="tx1"/>
+          </a:solidFill>
+        </p:spPr>
+        <p:style>
+          <a:lnRef idx="2">
+            <a:schemeClr val="accent1">
+              <a:shade val="15000"/>
+            </a:schemeClr>
+          </a:lnRef>
+          <a:fillRef idx="1">
+            <a:schemeClr val="accent1"/>
+          </a:fillRef>
+          <a:effectRef idx="0">
+            <a:schemeClr val="accent1"/>
+          </a:effectRef>
+          <a:fontRef idx="minor">
+            <a:schemeClr val="lt1"/>
+          </a:fontRef>
+        </p:style>
+        <p:txBody>
+          <a:bodyPr rtlCol="0" anchor="t"/>
+          <a:lstStyle/>
+          <a:p>
+            <a:pPr algn="ctr"/>
+            <a:r>
+              <a:rPr lang="en-US" sz="1100" dirty="0">
+                <a:solidFill>
+                  <a:schemeClr val="bg1"/>
+                </a:solidFill>
+              </a:rPr>
+              <a:t>Playing: 1</a:t>
+            </a:r>
+          </a:p>
+          <a:p>
+            <a:pPr algn="ctr"/>
+            <a:r>
+              <a:rPr lang="en-US" sz="1100" dirty="0">
+                <a:solidFill>
+                  <a:schemeClr val="bg1"/>
+                </a:solidFill>
+              </a:rPr>
+              <a:t>128 BPM</a:t>
+            </a:r>
+          </a:p>
+          <a:p>
+            <a:pPr algn="ctr"/>
+            <a:r>
+              <a:rPr lang="en-US" sz="1100" dirty="0">
+                <a:solidFill>
+                  <a:schemeClr val="bg1"/>
+                </a:solidFill>
+              </a:rPr>
+              <a:t>1:00/2:10</a:t>
+            </a:r>
+          </a:p>
+        </p:txBody>
+      </p:sp>
+      <p:sp>
+        <p:nvSpPr>
+          <p:cNvPr id="12" name="Isosceles Triangle 11">
+            <a:extLst>
+              <a:ext uri="{FF2B5EF4-FFF2-40B4-BE49-F238E27FC236}">
+                <a16:creationId xmlns:a16="http://schemas.microsoft.com/office/drawing/2014/main" id="{31F8BDD7-DD91-37AF-3DF3-A873A72B0063}"/>
+              </a:ext>
+            </a:extLst>
+          </p:cNvPr>
+          <p:cNvSpPr/>
+          <p:nvPr/>
+        </p:nvSpPr>
+        <p:spPr>
+          <a:xfrm rot="5400000">
+            <a:off x="5503934" y="3609722"/>
+            <a:ext cx="180000" cy="144000"/>
+          </a:xfrm>
+          <a:prstGeom prst="triangle">
+            <a:avLst/>
+          </a:prstGeom>
+          <a:solidFill>
+            <a:schemeClr val="tx1"/>
+          </a:solidFill>
+        </p:spPr>
+        <p:style>
+          <a:lnRef idx="2">
+            <a:schemeClr val="accent1">
+              <a:shade val="15000"/>
+            </a:schemeClr>
+          </a:lnRef>
+          <a:fillRef idx="1">
+            <a:schemeClr val="accent1"/>
+          </a:fillRef>
+          <a:effectRef idx="0">
+            <a:schemeClr val="accent1"/>
+          </a:effectRef>
+          <a:fontRef idx="minor">
+            <a:schemeClr val="lt1"/>
+          </a:fontRef>
+        </p:style>
+        <p:txBody>
+          <a:bodyPr rtlCol="0" anchor="ctr"/>
+          <a:lstStyle/>
+          <a:p>
+            <a:pPr algn="ctr"/>
+            <a:endParaRPr lang="en-US" dirty="0"/>
+          </a:p>
+        </p:txBody>
+      </p:sp>
+      <p:sp>
+        <p:nvSpPr>
+          <p:cNvPr id="13" name="Isosceles Triangle 12">
+            <a:extLst>
+              <a:ext uri="{FF2B5EF4-FFF2-40B4-BE49-F238E27FC236}">
+                <a16:creationId xmlns:a16="http://schemas.microsoft.com/office/drawing/2014/main" id="{CC345A07-23E3-6153-B14C-070298102D12}"/>
+              </a:ext>
+            </a:extLst>
+          </p:cNvPr>
+          <p:cNvSpPr/>
+          <p:nvPr/>
+        </p:nvSpPr>
+        <p:spPr>
+          <a:xfrm rot="5400000">
+            <a:off x="6020091" y="3609722"/>
+            <a:ext cx="180000" cy="144000"/>
+          </a:xfrm>
+          <a:prstGeom prst="triangle">
+            <a:avLst/>
+          </a:prstGeom>
+          <a:solidFill>
+            <a:schemeClr val="tx1"/>
+          </a:solidFill>
+        </p:spPr>
+        <p:style>
+          <a:lnRef idx="2">
+            <a:schemeClr val="accent1">
+              <a:shade val="15000"/>
+            </a:schemeClr>
+          </a:lnRef>
+          <a:fillRef idx="1">
+            <a:schemeClr val="accent1"/>
+          </a:fillRef>
+          <a:effectRef idx="0">
+            <a:schemeClr val="accent1"/>
+          </a:effectRef>
+          <a:fontRef idx="minor">
+            <a:schemeClr val="lt1"/>
+          </a:fontRef>
+        </p:style>
+        <p:txBody>
+          <a:bodyPr rtlCol="0" anchor="ctr"/>
+          <a:lstStyle/>
+          <a:p>
+            <a:pPr algn="ctr"/>
+            <a:endParaRPr lang="en-US"/>
+          </a:p>
+        </p:txBody>
+      </p:sp>
+      <p:sp>
+        <p:nvSpPr>
+          <p:cNvPr id="14" name="Isosceles Triangle 13">
+            <a:extLst>
+              <a:ext uri="{FF2B5EF4-FFF2-40B4-BE49-F238E27FC236}">
+                <a16:creationId xmlns:a16="http://schemas.microsoft.com/office/drawing/2014/main" id="{56D3AB65-E2E8-1D9C-9C30-C534564AF33D}"/>
+              </a:ext>
+            </a:extLst>
+          </p:cNvPr>
+          <p:cNvSpPr/>
+          <p:nvPr/>
+        </p:nvSpPr>
+        <p:spPr>
+          <a:xfrm rot="16200000">
+            <a:off x="3055463" y="3609722"/>
+            <a:ext cx="180000" cy="144000"/>
+          </a:xfrm>
+          <a:prstGeom prst="triangle">
+            <a:avLst/>
+          </a:prstGeom>
+          <a:solidFill>
+            <a:schemeClr val="tx1"/>
+          </a:solidFill>
+        </p:spPr>
+        <p:style>
+          <a:lnRef idx="2">
+            <a:schemeClr val="accent1">
+              <a:shade val="15000"/>
+            </a:schemeClr>
+          </a:lnRef>
+          <a:fillRef idx="1">
+            <a:schemeClr val="accent1"/>
+          </a:fillRef>
+          <a:effectRef idx="0">
+            <a:schemeClr val="accent1"/>
+          </a:effectRef>
+          <a:fontRef idx="minor">
+            <a:schemeClr val="lt1"/>
+          </a:fontRef>
+        </p:style>
+        <p:txBody>
+          <a:bodyPr rtlCol="0" anchor="ctr"/>
+          <a:lstStyle/>
+          <a:p>
+            <a:pPr algn="ctr"/>
+            <a:endParaRPr lang="en-US" dirty="0"/>
+          </a:p>
+        </p:txBody>
+      </p:sp>
+      <p:sp>
+        <p:nvSpPr>
+          <p:cNvPr id="15" name="Isosceles Triangle 14">
+            <a:extLst>
+              <a:ext uri="{FF2B5EF4-FFF2-40B4-BE49-F238E27FC236}">
+                <a16:creationId xmlns:a16="http://schemas.microsoft.com/office/drawing/2014/main" id="{A2E9077D-A1A5-E29E-CCD7-E1729DA5768B}"/>
+              </a:ext>
+            </a:extLst>
+          </p:cNvPr>
+          <p:cNvSpPr/>
+          <p:nvPr/>
+        </p:nvSpPr>
+        <p:spPr>
+          <a:xfrm rot="16200000">
+            <a:off x="3535620" y="3609721"/>
+            <a:ext cx="180000" cy="144000"/>
+          </a:xfrm>
+          <a:prstGeom prst="triangle">
+            <a:avLst/>
+          </a:prstGeom>
+          <a:solidFill>
+            <a:schemeClr val="tx1"/>
+          </a:solidFill>
+        </p:spPr>
+        <p:style>
+          <a:lnRef idx="2">
+            <a:schemeClr val="accent1">
+              <a:shade val="15000"/>
+            </a:schemeClr>
+          </a:lnRef>
+          <a:fillRef idx="1">
+            <a:schemeClr val="accent1"/>
+          </a:fillRef>
+          <a:effectRef idx="0">
+            <a:schemeClr val="accent1"/>
+          </a:effectRef>
+          <a:fontRef idx="minor">
+            <a:schemeClr val="lt1"/>
+          </a:fontRef>
+        </p:style>
+        <p:txBody>
+          <a:bodyPr rtlCol="0" anchor="ctr"/>
+          <a:lstStyle/>
+          <a:p>
+            <a:pPr algn="ctr"/>
+            <a:endParaRPr lang="en-US" dirty="0"/>
+          </a:p>
+        </p:txBody>
+      </p:sp>
+    </p:spTree>
+    <p:extLst>
+      <p:ext uri="{BB962C8B-B14F-4D97-AF65-F5344CB8AC3E}">
+        <p14:creationId xmlns:p14="http://schemas.microsoft.com/office/powerpoint/2010/main" val="2680026350"/>
+      </p:ext>
+    </p:extLst>
+  </p:cSld>
+  <p:clrMapOvr>
+    <a:masterClrMapping/>
+  </p:clrMapOvr>
+</p:sld>
+</file>
+
 <file path=ppt/theme/theme1.xml><?xml version="1.0" encoding="utf-8"?>
 <a:theme xmlns:a="http://schemas.openxmlformats.org/drawingml/2006/main" name="Office Theme">
   <a:themeElements>

</xml_diff>